<commit_message>
adding numbers to image
</commit_message>
<xml_diff>
--- a/oreilly-sa-2018/img/api-internal-external.pptx
+++ b/oreilly-sa-2018/img/api-internal-external.pptx
@@ -3534,9 +3534,9 @@
           <p:nvPr/>
         </p:nvCxnSpPr>
         <p:spPr>
-          <a:xfrm flipH="1">
-            <a:off x="3888583" y="3783807"/>
-            <a:ext cx="842962" cy="101202"/>
+          <a:xfrm flipH="1" flipV="1">
+            <a:off x="3936208" y="3782616"/>
+            <a:ext cx="795337" cy="1191"/>
           </a:xfrm>
           <a:prstGeom prst="line">
             <a:avLst/>
@@ -3730,48 +3730,6 @@
       </p:cxnSp>
       <p:cxnSp>
         <p:nvCxnSpPr>
-          <p:cNvPr id="60" name="Straight Connector 59">
-            <a:extLst>
-              <a:ext uri="{FF2B5EF4-FFF2-40B4-BE49-F238E27FC236}">
-                <a16:creationId xmlns:a16="http://schemas.microsoft.com/office/drawing/2014/main" id="{F1FE1167-367E-6447-9BB6-08B4CE22E355}"/>
-              </a:ext>
-            </a:extLst>
-          </p:cNvPr>
-          <p:cNvCxnSpPr>
-            <a:cxnSpLocks/>
-            <a:stCxn id="26" idx="0"/>
-          </p:cNvCxnSpPr>
-          <p:nvPr/>
-        </p:nvCxnSpPr>
-        <p:spPr>
-          <a:xfrm flipH="1" flipV="1">
-            <a:off x="3888584" y="3811786"/>
-            <a:ext cx="506014" cy="445889"/>
-          </a:xfrm>
-          <a:prstGeom prst="line">
-            <a:avLst/>
-          </a:prstGeom>
-          <a:ln w="41275">
-            <a:headEnd type="triangle"/>
-          </a:ln>
-        </p:spPr>
-        <p:style>
-          <a:lnRef idx="1">
-            <a:schemeClr val="accent1"/>
-          </a:lnRef>
-          <a:fillRef idx="0">
-            <a:schemeClr val="accent1"/>
-          </a:fillRef>
-          <a:effectRef idx="0">
-            <a:schemeClr val="accent1"/>
-          </a:effectRef>
-          <a:fontRef idx="minor">
-            <a:schemeClr val="tx1"/>
-          </a:fontRef>
-        </p:style>
-      </p:cxnSp>
-      <p:cxnSp>
-        <p:nvCxnSpPr>
           <p:cNvPr id="63" name="Straight Connector 62">
             <a:extLst>
               <a:ext uri="{FF2B5EF4-FFF2-40B4-BE49-F238E27FC236}">
@@ -4228,48 +4186,6 @@
       </p:cxnSp>
       <p:cxnSp>
         <p:nvCxnSpPr>
-          <p:cNvPr id="96" name="Straight Connector 95">
-            <a:extLst>
-              <a:ext uri="{FF2B5EF4-FFF2-40B4-BE49-F238E27FC236}">
-                <a16:creationId xmlns:a16="http://schemas.microsoft.com/office/drawing/2014/main" id="{40FB3483-0042-9B45-8701-E6DBDACCCAAC}"/>
-              </a:ext>
-            </a:extLst>
-          </p:cNvPr>
-          <p:cNvCxnSpPr>
-            <a:cxnSpLocks/>
-            <a:stCxn id="27" idx="0"/>
-          </p:cNvCxnSpPr>
-          <p:nvPr/>
-        </p:nvCxnSpPr>
-        <p:spPr>
-          <a:xfrm flipV="1">
-            <a:off x="3771903" y="4471987"/>
-            <a:ext cx="601861" cy="486966"/>
-          </a:xfrm>
-          <a:prstGeom prst="line">
-            <a:avLst/>
-          </a:prstGeom>
-          <a:ln w="41275">
-            <a:headEnd type="triangle"/>
-          </a:ln>
-        </p:spPr>
-        <p:style>
-          <a:lnRef idx="1">
-            <a:schemeClr val="accent1"/>
-          </a:lnRef>
-          <a:fillRef idx="0">
-            <a:schemeClr val="accent1"/>
-          </a:fillRef>
-          <a:effectRef idx="0">
-            <a:schemeClr val="accent1"/>
-          </a:effectRef>
-          <a:fontRef idx="minor">
-            <a:schemeClr val="tx1"/>
-          </a:fontRef>
-        </p:style>
-      </p:cxnSp>
-      <p:cxnSp>
-        <p:nvCxnSpPr>
           <p:cNvPr id="99" name="Straight Connector 98">
             <a:extLst>
               <a:ext uri="{FF2B5EF4-FFF2-40B4-BE49-F238E27FC236}">
@@ -4451,7 +4367,7 @@
         </p:nvCxnSpPr>
         <p:spPr>
           <a:xfrm flipH="1">
-            <a:off x="2828927" y="3848100"/>
+            <a:off x="2845859" y="3746037"/>
             <a:ext cx="769143" cy="73818"/>
           </a:xfrm>
           <a:prstGeom prst="line">
@@ -5248,10 +5164,10 @@
       </p:sp>
       <p:sp>
         <p:nvSpPr>
-          <p:cNvPr id="26" name="Rounded Rectangle 25">
-            <a:extLst>
-              <a:ext uri="{FF2B5EF4-FFF2-40B4-BE49-F238E27FC236}">
-                <a16:creationId xmlns:a16="http://schemas.microsoft.com/office/drawing/2014/main" id="{96C425EF-DAC7-3448-828D-4DFBC4CF0D08}"/>
+          <p:cNvPr id="27" name="Rounded Rectangle 26">
+            <a:extLst>
+              <a:ext uri="{FF2B5EF4-FFF2-40B4-BE49-F238E27FC236}">
+                <a16:creationId xmlns:a16="http://schemas.microsoft.com/office/drawing/2014/main" id="{96698D6D-C7C6-D647-BE84-1B59429D6982}"/>
               </a:ext>
             </a:extLst>
           </p:cNvPr>
@@ -5260,7 +5176,7 @@
         </p:nvSpPr>
         <p:spPr>
           <a:xfrm>
-            <a:off x="4065985" y="4257675"/>
+            <a:off x="3443290" y="4958953"/>
             <a:ext cx="657225" cy="428625"/>
           </a:xfrm>
           <a:prstGeom prst="roundRect">
@@ -5300,10 +5216,10 @@
       </p:sp>
       <p:sp>
         <p:nvSpPr>
-          <p:cNvPr id="27" name="Rounded Rectangle 26">
-            <a:extLst>
-              <a:ext uri="{FF2B5EF4-FFF2-40B4-BE49-F238E27FC236}">
-                <a16:creationId xmlns:a16="http://schemas.microsoft.com/office/drawing/2014/main" id="{96698D6D-C7C6-D647-BE84-1B59429D6982}"/>
+          <p:cNvPr id="28" name="Rounded Rectangle 27">
+            <a:extLst>
+              <a:ext uri="{FF2B5EF4-FFF2-40B4-BE49-F238E27FC236}">
+                <a16:creationId xmlns:a16="http://schemas.microsoft.com/office/drawing/2014/main" id="{DEC8FF55-2F1D-3B4B-9187-7E972268B098}"/>
               </a:ext>
             </a:extLst>
           </p:cNvPr>
@@ -5312,7 +5228,7 @@
         </p:nvSpPr>
         <p:spPr>
           <a:xfrm>
-            <a:off x="3443290" y="4958953"/>
+            <a:off x="4095752" y="2924175"/>
             <a:ext cx="657225" cy="428625"/>
           </a:xfrm>
           <a:prstGeom prst="roundRect">
@@ -5352,10 +5268,10 @@
       </p:sp>
       <p:sp>
         <p:nvSpPr>
-          <p:cNvPr id="28" name="Rounded Rectangle 27">
-            <a:extLst>
-              <a:ext uri="{FF2B5EF4-FFF2-40B4-BE49-F238E27FC236}">
-                <a16:creationId xmlns:a16="http://schemas.microsoft.com/office/drawing/2014/main" id="{DEC8FF55-2F1D-3B4B-9187-7E972268B098}"/>
+          <p:cNvPr id="29" name="Rounded Rectangle 28">
+            <a:extLst>
+              <a:ext uri="{FF2B5EF4-FFF2-40B4-BE49-F238E27FC236}">
+                <a16:creationId xmlns:a16="http://schemas.microsoft.com/office/drawing/2014/main" id="{FF312E9B-8F69-5945-82B5-B16430C64B34}"/>
               </a:ext>
             </a:extLst>
           </p:cNvPr>
@@ -5364,7 +5280,7 @@
         </p:nvSpPr>
         <p:spPr>
           <a:xfrm>
-            <a:off x="4095752" y="2924175"/>
+            <a:off x="3615002" y="3531724"/>
             <a:ext cx="657225" cy="428625"/>
           </a:xfrm>
           <a:prstGeom prst="roundRect">
@@ -5404,10 +5320,10 @@
       </p:sp>
       <p:sp>
         <p:nvSpPr>
-          <p:cNvPr id="29" name="Rounded Rectangle 28">
-            <a:extLst>
-              <a:ext uri="{FF2B5EF4-FFF2-40B4-BE49-F238E27FC236}">
-                <a16:creationId xmlns:a16="http://schemas.microsoft.com/office/drawing/2014/main" id="{FF312E9B-8F69-5945-82B5-B16430C64B34}"/>
+          <p:cNvPr id="30" name="Rounded Rectangle 29">
+            <a:extLst>
+              <a:ext uri="{FF2B5EF4-FFF2-40B4-BE49-F238E27FC236}">
+                <a16:creationId xmlns:a16="http://schemas.microsoft.com/office/drawing/2014/main" id="{C1C8DAB0-7507-3C46-B97D-B5492D4034B4}"/>
               </a:ext>
             </a:extLst>
           </p:cNvPr>
@@ -5416,7 +5332,7 @@
         </p:nvSpPr>
         <p:spPr>
           <a:xfrm>
-            <a:off x="3598070" y="3633787"/>
+            <a:off x="5148264" y="4227908"/>
             <a:ext cx="657225" cy="428625"/>
           </a:xfrm>
           <a:prstGeom prst="roundRect">
@@ -5456,10 +5372,10 @@
       </p:sp>
       <p:sp>
         <p:nvSpPr>
-          <p:cNvPr id="30" name="Rounded Rectangle 29">
-            <a:extLst>
-              <a:ext uri="{FF2B5EF4-FFF2-40B4-BE49-F238E27FC236}">
-                <a16:creationId xmlns:a16="http://schemas.microsoft.com/office/drawing/2014/main" id="{C1C8DAB0-7507-3C46-B97D-B5492D4034B4}"/>
+          <p:cNvPr id="31" name="Rounded Rectangle 30">
+            <a:extLst>
+              <a:ext uri="{FF2B5EF4-FFF2-40B4-BE49-F238E27FC236}">
+                <a16:creationId xmlns:a16="http://schemas.microsoft.com/office/drawing/2014/main" id="{CCDF89DD-07E8-C24C-A7D3-EAAC5924B70D}"/>
               </a:ext>
             </a:extLst>
           </p:cNvPr>
@@ -5468,7 +5384,7 @@
         </p:nvSpPr>
         <p:spPr>
           <a:xfrm>
-            <a:off x="5148264" y="4227908"/>
+            <a:off x="10813262" y="5468540"/>
             <a:ext cx="657225" cy="428625"/>
           </a:xfrm>
           <a:prstGeom prst="roundRect">
@@ -5508,10 +5424,10 @@
       </p:sp>
       <p:sp>
         <p:nvSpPr>
-          <p:cNvPr id="31" name="Rounded Rectangle 30">
-            <a:extLst>
-              <a:ext uri="{FF2B5EF4-FFF2-40B4-BE49-F238E27FC236}">
-                <a16:creationId xmlns:a16="http://schemas.microsoft.com/office/drawing/2014/main" id="{CCDF89DD-07E8-C24C-A7D3-EAAC5924B70D}"/>
+          <p:cNvPr id="32" name="Rounded Rectangle 31">
+            <a:extLst>
+              <a:ext uri="{FF2B5EF4-FFF2-40B4-BE49-F238E27FC236}">
+                <a16:creationId xmlns:a16="http://schemas.microsoft.com/office/drawing/2014/main" id="{6D1E41F6-CD23-084D-8E16-090170467D6B}"/>
               </a:ext>
             </a:extLst>
           </p:cNvPr>
@@ -5520,7 +5436,7 @@
         </p:nvSpPr>
         <p:spPr>
           <a:xfrm>
-            <a:off x="10813262" y="5468540"/>
+            <a:off x="10327482" y="4825602"/>
             <a:ext cx="657225" cy="428625"/>
           </a:xfrm>
           <a:prstGeom prst="roundRect">
@@ -5560,10 +5476,10 @@
       </p:sp>
       <p:sp>
         <p:nvSpPr>
-          <p:cNvPr id="32" name="Rounded Rectangle 31">
-            <a:extLst>
-              <a:ext uri="{FF2B5EF4-FFF2-40B4-BE49-F238E27FC236}">
-                <a16:creationId xmlns:a16="http://schemas.microsoft.com/office/drawing/2014/main" id="{6D1E41F6-CD23-084D-8E16-090170467D6B}"/>
+          <p:cNvPr id="33" name="Rounded Rectangle 32">
+            <a:extLst>
+              <a:ext uri="{FF2B5EF4-FFF2-40B4-BE49-F238E27FC236}">
+                <a16:creationId xmlns:a16="http://schemas.microsoft.com/office/drawing/2014/main" id="{8DA0D49B-69D8-B74C-9A71-2CF98CF5D2F7}"/>
               </a:ext>
             </a:extLst>
           </p:cNvPr>
@@ -5572,7 +5488,7 @@
         </p:nvSpPr>
         <p:spPr>
           <a:xfrm>
-            <a:off x="10327482" y="4825602"/>
+            <a:off x="9689307" y="5413773"/>
             <a:ext cx="657225" cy="428625"/>
           </a:xfrm>
           <a:prstGeom prst="roundRect">
@@ -5612,10 +5528,10 @@
       </p:sp>
       <p:sp>
         <p:nvSpPr>
-          <p:cNvPr id="33" name="Rounded Rectangle 32">
-            <a:extLst>
-              <a:ext uri="{FF2B5EF4-FFF2-40B4-BE49-F238E27FC236}">
-                <a16:creationId xmlns:a16="http://schemas.microsoft.com/office/drawing/2014/main" id="{8DA0D49B-69D8-B74C-9A71-2CF98CF5D2F7}"/>
+          <p:cNvPr id="34" name="Rounded Rectangle 33">
+            <a:extLst>
+              <a:ext uri="{FF2B5EF4-FFF2-40B4-BE49-F238E27FC236}">
+                <a16:creationId xmlns:a16="http://schemas.microsoft.com/office/drawing/2014/main" id="{EFBDFA32-939E-5249-B6DB-141B1308A2D2}"/>
               </a:ext>
             </a:extLst>
           </p:cNvPr>
@@ -5624,7 +5540,7 @@
         </p:nvSpPr>
         <p:spPr>
           <a:xfrm>
-            <a:off x="9689307" y="5413773"/>
+            <a:off x="9929813" y="2501505"/>
             <a:ext cx="657225" cy="428625"/>
           </a:xfrm>
           <a:prstGeom prst="roundRect">
@@ -5664,10 +5580,10 @@
       </p:sp>
       <p:sp>
         <p:nvSpPr>
-          <p:cNvPr id="34" name="Rounded Rectangle 33">
-            <a:extLst>
-              <a:ext uri="{FF2B5EF4-FFF2-40B4-BE49-F238E27FC236}">
-                <a16:creationId xmlns:a16="http://schemas.microsoft.com/office/drawing/2014/main" id="{EFBDFA32-939E-5249-B6DB-141B1308A2D2}"/>
+          <p:cNvPr id="35" name="Rounded Rectangle 34">
+            <a:extLst>
+              <a:ext uri="{FF2B5EF4-FFF2-40B4-BE49-F238E27FC236}">
+                <a16:creationId xmlns:a16="http://schemas.microsoft.com/office/drawing/2014/main" id="{EA9ADB18-7E44-0C40-9CD5-3A0D95DE0C0B}"/>
               </a:ext>
             </a:extLst>
           </p:cNvPr>
@@ -5676,7 +5592,7 @@
         </p:nvSpPr>
         <p:spPr>
           <a:xfrm>
-            <a:off x="9929813" y="2501505"/>
+            <a:off x="8948738" y="2435425"/>
             <a:ext cx="657225" cy="428625"/>
           </a:xfrm>
           <a:prstGeom prst="roundRect">
@@ -5716,10 +5632,10 @@
       </p:sp>
       <p:sp>
         <p:nvSpPr>
-          <p:cNvPr id="35" name="Rounded Rectangle 34">
-            <a:extLst>
-              <a:ext uri="{FF2B5EF4-FFF2-40B4-BE49-F238E27FC236}">
-                <a16:creationId xmlns:a16="http://schemas.microsoft.com/office/drawing/2014/main" id="{EA9ADB18-7E44-0C40-9CD5-3A0D95DE0C0B}"/>
+          <p:cNvPr id="36" name="Rounded Rectangle 35">
+            <a:extLst>
+              <a:ext uri="{FF2B5EF4-FFF2-40B4-BE49-F238E27FC236}">
+                <a16:creationId xmlns:a16="http://schemas.microsoft.com/office/drawing/2014/main" id="{64B613A8-2E3F-C742-9CE9-652FF3FC8025}"/>
               </a:ext>
             </a:extLst>
           </p:cNvPr>
@@ -5728,7 +5644,7 @@
         </p:nvSpPr>
         <p:spPr>
           <a:xfrm>
-            <a:off x="8948738" y="2435425"/>
+            <a:off x="6448432" y="4296965"/>
             <a:ext cx="657225" cy="428625"/>
           </a:xfrm>
           <a:prstGeom prst="roundRect">
@@ -5768,10 +5684,10 @@
       </p:sp>
       <p:sp>
         <p:nvSpPr>
-          <p:cNvPr id="36" name="Rounded Rectangle 35">
-            <a:extLst>
-              <a:ext uri="{FF2B5EF4-FFF2-40B4-BE49-F238E27FC236}">
-                <a16:creationId xmlns:a16="http://schemas.microsoft.com/office/drawing/2014/main" id="{64B613A8-2E3F-C742-9CE9-652FF3FC8025}"/>
+          <p:cNvPr id="37" name="Rounded Rectangle 36">
+            <a:extLst>
+              <a:ext uri="{FF2B5EF4-FFF2-40B4-BE49-F238E27FC236}">
+                <a16:creationId xmlns:a16="http://schemas.microsoft.com/office/drawing/2014/main" id="{042E0965-C472-4F4D-AE61-E1A560A17B4F}"/>
               </a:ext>
             </a:extLst>
           </p:cNvPr>
@@ -5780,7 +5696,7 @@
         </p:nvSpPr>
         <p:spPr>
           <a:xfrm>
-            <a:off x="6448432" y="4296965"/>
+            <a:off x="5691186" y="4902396"/>
             <a:ext cx="657225" cy="428625"/>
           </a:xfrm>
           <a:prstGeom prst="roundRect">
@@ -5820,10 +5736,10 @@
       </p:sp>
       <p:sp>
         <p:nvSpPr>
-          <p:cNvPr id="37" name="Rounded Rectangle 36">
-            <a:extLst>
-              <a:ext uri="{FF2B5EF4-FFF2-40B4-BE49-F238E27FC236}">
-                <a16:creationId xmlns:a16="http://schemas.microsoft.com/office/drawing/2014/main" id="{042E0965-C472-4F4D-AE61-E1A560A17B4F}"/>
+          <p:cNvPr id="38" name="Rounded Rectangle 37">
+            <a:extLst>
+              <a:ext uri="{FF2B5EF4-FFF2-40B4-BE49-F238E27FC236}">
+                <a16:creationId xmlns:a16="http://schemas.microsoft.com/office/drawing/2014/main" id="{D3CA5166-15E8-134E-8546-9BAF00485644}"/>
               </a:ext>
             </a:extLst>
           </p:cNvPr>
@@ -5832,7 +5748,7 @@
         </p:nvSpPr>
         <p:spPr>
           <a:xfrm>
-            <a:off x="5691186" y="4902396"/>
+            <a:off x="5648326" y="3633787"/>
             <a:ext cx="657225" cy="428625"/>
           </a:xfrm>
           <a:prstGeom prst="roundRect">
@@ -5872,10 +5788,10 @@
       </p:sp>
       <p:sp>
         <p:nvSpPr>
-          <p:cNvPr id="38" name="Rounded Rectangle 37">
-            <a:extLst>
-              <a:ext uri="{FF2B5EF4-FFF2-40B4-BE49-F238E27FC236}">
-                <a16:creationId xmlns:a16="http://schemas.microsoft.com/office/drawing/2014/main" id="{D3CA5166-15E8-134E-8546-9BAF00485644}"/>
+          <p:cNvPr id="2" name="Oval 1">
+            <a:extLst>
+              <a:ext uri="{FF2B5EF4-FFF2-40B4-BE49-F238E27FC236}">
+                <a16:creationId xmlns:a16="http://schemas.microsoft.com/office/drawing/2014/main" id="{D7AEC38B-59F4-0D40-9588-F67A2E740883}"/>
               </a:ext>
             </a:extLst>
           </p:cNvPr>
@@ -5884,14 +5800,22 @@
         </p:nvSpPr>
         <p:spPr>
           <a:xfrm>
-            <a:off x="5648326" y="3633787"/>
-            <a:ext cx="657225" cy="428625"/>
-          </a:xfrm>
-          <a:prstGeom prst="roundRect">
+            <a:off x="4034223" y="4127103"/>
+            <a:ext cx="594519" cy="598487"/>
+          </a:xfrm>
+          <a:prstGeom prst="ellipse">
             <a:avLst/>
           </a:prstGeom>
-          <a:ln>
-            <a:headEnd type="triangle"/>
+          <a:solidFill>
+            <a:schemeClr val="accent1">
+              <a:lumMod val="20000"/>
+              <a:lumOff val="80000"/>
+            </a:schemeClr>
+          </a:solidFill>
+          <a:ln w="63500">
+            <a:solidFill>
+              <a:schemeClr val="accent1"/>
+            </a:solidFill>
           </a:ln>
         </p:spPr>
         <p:style>
@@ -5914,10 +5838,142 @@
           <a:bodyPr rtlCol="0" anchor="ctr"/>
           <a:lstStyle/>
           <a:p>
-            <a:pPr algn="ctr"/>
-            <a:r>
-              <a:rPr lang="en-US" dirty="0"/>
-              <a:t>API</a:t>
+            <a:pPr algn="r"/>
+            <a:r>
+              <a:rPr lang="en-US" sz="3600" dirty="0">
+                <a:solidFill>
+                  <a:schemeClr val="accent1"/>
+                </a:solidFill>
+              </a:rPr>
+              <a:t>1</a:t>
+            </a:r>
+          </a:p>
+        </p:txBody>
+      </p:sp>
+      <p:sp>
+        <p:nvSpPr>
+          <p:cNvPr id="59" name="Oval 58">
+            <a:extLst>
+              <a:ext uri="{FF2B5EF4-FFF2-40B4-BE49-F238E27FC236}">
+                <a16:creationId xmlns:a16="http://schemas.microsoft.com/office/drawing/2014/main" id="{BF3AB4EF-3EA2-D243-91B1-3A6F620F8AF4}"/>
+              </a:ext>
+            </a:extLst>
+          </p:cNvPr>
+          <p:cNvSpPr/>
+          <p:nvPr/>
+        </p:nvSpPr>
+        <p:spPr>
+          <a:xfrm>
+            <a:off x="7879755" y="4081264"/>
+            <a:ext cx="594519" cy="598487"/>
+          </a:xfrm>
+          <a:prstGeom prst="ellipse">
+            <a:avLst/>
+          </a:prstGeom>
+          <a:solidFill>
+            <a:schemeClr val="accent1">
+              <a:lumMod val="20000"/>
+              <a:lumOff val="80000"/>
+            </a:schemeClr>
+          </a:solidFill>
+          <a:ln w="63500">
+            <a:solidFill>
+              <a:schemeClr val="accent1"/>
+            </a:solidFill>
+          </a:ln>
+        </p:spPr>
+        <p:style>
+          <a:lnRef idx="2">
+            <a:schemeClr val="accent1">
+              <a:shade val="50000"/>
+            </a:schemeClr>
+          </a:lnRef>
+          <a:fillRef idx="1">
+            <a:schemeClr val="accent1"/>
+          </a:fillRef>
+          <a:effectRef idx="0">
+            <a:schemeClr val="accent1"/>
+          </a:effectRef>
+          <a:fontRef idx="minor">
+            <a:schemeClr val="lt1"/>
+          </a:fontRef>
+        </p:style>
+        <p:txBody>
+          <a:bodyPr rtlCol="0" anchor="ctr"/>
+          <a:lstStyle/>
+          <a:p>
+            <a:pPr algn="r"/>
+            <a:r>
+              <a:rPr lang="en-US" sz="3600" dirty="0">
+                <a:solidFill>
+                  <a:schemeClr val="accent1"/>
+                </a:solidFill>
+              </a:rPr>
+              <a:t>2</a:t>
+            </a:r>
+          </a:p>
+        </p:txBody>
+      </p:sp>
+      <p:sp>
+        <p:nvSpPr>
+          <p:cNvPr id="61" name="Oval 60">
+            <a:extLst>
+              <a:ext uri="{FF2B5EF4-FFF2-40B4-BE49-F238E27FC236}">
+                <a16:creationId xmlns:a16="http://schemas.microsoft.com/office/drawing/2014/main" id="{EF0885DB-B197-9447-A477-A1B00CB470F3}"/>
+              </a:ext>
+            </a:extLst>
+          </p:cNvPr>
+          <p:cNvSpPr/>
+          <p:nvPr/>
+        </p:nvSpPr>
+        <p:spPr>
+          <a:xfrm>
+            <a:off x="6158705" y="1413474"/>
+            <a:ext cx="594519" cy="598487"/>
+          </a:xfrm>
+          <a:prstGeom prst="ellipse">
+            <a:avLst/>
+          </a:prstGeom>
+          <a:solidFill>
+            <a:schemeClr val="accent1">
+              <a:lumMod val="20000"/>
+              <a:lumOff val="80000"/>
+            </a:schemeClr>
+          </a:solidFill>
+          <a:ln w="63500">
+            <a:solidFill>
+              <a:schemeClr val="accent1"/>
+            </a:solidFill>
+          </a:ln>
+        </p:spPr>
+        <p:style>
+          <a:lnRef idx="2">
+            <a:schemeClr val="accent1">
+              <a:shade val="50000"/>
+            </a:schemeClr>
+          </a:lnRef>
+          <a:fillRef idx="1">
+            <a:schemeClr val="accent1"/>
+          </a:fillRef>
+          <a:effectRef idx="0">
+            <a:schemeClr val="accent1"/>
+          </a:effectRef>
+          <a:fontRef idx="minor">
+            <a:schemeClr val="lt1"/>
+          </a:fontRef>
+        </p:style>
+        <p:txBody>
+          <a:bodyPr rtlCol="0" anchor="ctr"/>
+          <a:lstStyle/>
+          <a:p>
+            <a:pPr algn="r"/>
+            <a:r>
+              <a:rPr lang="en-US" sz="3600" dirty="0">
+                <a:solidFill>
+                  <a:schemeClr val="accent1"/>
+                </a:solidFill>
+              </a:rPr>
+              <a:t>3</a:t>
             </a:r>
           </a:p>
         </p:txBody>

</xml_diff>